<commit_message>
Worked on GDD. Started properly whiteboxing proto level.
</commit_message>
<xml_diff>
--- a/Design Documents/Systems.pptx
+++ b/Design Documents/Systems.pptx
@@ -2982,6 +2982,49 @@
       </p:grpSpPr>
       <p:cxnSp>
         <p:nvCxnSpPr>
+          <p:cNvPr id="1718" name="Curved Connector 1717">
+            <a:extLst>
+              <a:ext uri="{FF2B5EF4-FFF2-40B4-BE49-F238E27FC236}">
+                <a16:creationId xmlns:a16="http://schemas.microsoft.com/office/drawing/2014/main" id="{1F0511D9-D0D9-9ACA-0870-ED1F088401E4}"/>
+              </a:ext>
+            </a:extLst>
+          </p:cNvPr>
+          <p:cNvCxnSpPr>
+            <a:cxnSpLocks/>
+            <a:stCxn id="166" idx="2"/>
+            <a:endCxn id="1715" idx="0"/>
+          </p:cNvCxnSpPr>
+          <p:nvPr/>
+        </p:nvCxnSpPr>
+        <p:spPr>
+          <a:xfrm rot="16200000" flipH="1">
+            <a:off x="15531880" y="4072618"/>
+            <a:ext cx="832846" cy="245008"/>
+          </a:xfrm>
+          <a:prstGeom prst="curvedConnector3">
+            <a:avLst>
+              <a:gd name="adj1" fmla="val 50000"/>
+            </a:avLst>
+          </a:prstGeom>
+          <a:ln w="19050"/>
+        </p:spPr>
+        <p:style>
+          <a:lnRef idx="1">
+            <a:schemeClr val="accent1"/>
+          </a:lnRef>
+          <a:fillRef idx="0">
+            <a:schemeClr val="accent1"/>
+          </a:fillRef>
+          <a:effectRef idx="0">
+            <a:schemeClr val="accent1"/>
+          </a:effectRef>
+          <a:fontRef idx="minor">
+            <a:schemeClr val="tx1"/>
+          </a:fontRef>
+        </p:style>
+      </p:cxnSp>
+      <p:cxnSp>
+        <p:nvCxnSpPr>
           <p:cNvPr id="1067" name="Curved Connector 1066">
             <a:extLst>
               <a:ext uri="{FF2B5EF4-FFF2-40B4-BE49-F238E27FC236}">
@@ -4795,7 +4838,7 @@
                 <a:ea typeface="Palatino" pitchFamily="2" charset="77"/>
                 <a:cs typeface="Baloo 2" panose="03080502040302020200" pitchFamily="66" charset="77"/>
               </a:rPr>
-              <a:t>MOVE 4D</a:t>
+              <a:t>MOVE 4 DIRECTIONS</a:t>
             </a:r>
           </a:p>
         </p:txBody>
@@ -5473,8 +5516,8 @@
         </p:nvCxnSpPr>
         <p:spPr>
           <a:xfrm rot="5400000">
-            <a:off x="15395354" y="3759244"/>
-            <a:ext cx="410991" cy="449901"/>
+            <a:off x="15334094" y="3593118"/>
+            <a:ext cx="306124" cy="677287"/>
           </a:xfrm>
           <a:prstGeom prst="curvedConnector3">
             <a:avLst>
@@ -5624,7 +5667,7 @@
         </p:nvSpPr>
         <p:spPr>
           <a:xfrm>
-            <a:off x="16135833" y="4173705"/>
+            <a:off x="16445179" y="4091271"/>
             <a:ext cx="1045567" cy="418274"/>
           </a:xfrm>
           <a:prstGeom prst="roundRect">
@@ -5697,8 +5740,8 @@
         </p:nvCxnSpPr>
         <p:spPr>
           <a:xfrm rot="16200000" flipH="1">
-            <a:off x="16044705" y="3559793"/>
-            <a:ext cx="395006" cy="832818"/>
+            <a:off x="16240595" y="3363903"/>
+            <a:ext cx="312572" cy="1142164"/>
           </a:xfrm>
           <a:prstGeom prst="curvedConnector3">
             <a:avLst>
@@ -5805,7 +5848,7 @@
         </p:nvSpPr>
         <p:spPr>
           <a:xfrm>
-            <a:off x="14853114" y="4189690"/>
+            <a:off x="14625728" y="4084823"/>
             <a:ext cx="1045567" cy="418274"/>
           </a:xfrm>
           <a:prstGeom prst="roundRect">
@@ -7894,7 +7937,7 @@
           </a:solidFill>
           <a:ln w="38100">
             <a:solidFill>
-              <a:srgbClr val="7030A0"/>
+              <a:srgbClr val="00B050"/>
             </a:solidFill>
           </a:ln>
         </p:spPr>
@@ -8219,7 +8262,7 @@
         </p:nvSpPr>
         <p:spPr>
           <a:xfrm>
-            <a:off x="26631799" y="1435981"/>
+            <a:off x="26811344" y="1456722"/>
             <a:ext cx="1045567" cy="418274"/>
           </a:xfrm>
           <a:prstGeom prst="roundRect">
@@ -8290,8 +8333,8 @@
         </p:nvCxnSpPr>
         <p:spPr>
           <a:xfrm rot="16200000" flipV="1">
-            <a:off x="22118819" y="-3599784"/>
-            <a:ext cx="879798" cy="9191731"/>
+            <a:off x="22198221" y="-3679185"/>
+            <a:ext cx="900539" cy="9371276"/>
           </a:xfrm>
           <a:prstGeom prst="curvedConnector3">
             <a:avLst>
@@ -8329,7 +8372,7 @@
         </p:nvSpPr>
         <p:spPr>
           <a:xfrm>
-            <a:off x="26640861" y="2201498"/>
+            <a:off x="26097667" y="2141749"/>
             <a:ext cx="1045567" cy="418274"/>
           </a:xfrm>
           <a:prstGeom prst="roundRect">
@@ -8401,9 +8444,9 @@
           <p:nvPr/>
         </p:nvCxnSpPr>
         <p:spPr>
-          <a:xfrm rot="16200000" flipH="1">
-            <a:off x="26985493" y="2023345"/>
-            <a:ext cx="347243" cy="9062"/>
+          <a:xfrm rot="5400000">
+            <a:off x="26843914" y="1651534"/>
+            <a:ext cx="266753" cy="713677"/>
           </a:xfrm>
           <a:prstGeom prst="curvedConnector3">
             <a:avLst>
@@ -12455,6 +12498,187 @@
           <a:xfrm rot="16200000" flipH="1">
             <a:off x="6375090" y="2367935"/>
             <a:ext cx="383565" cy="906182"/>
+          </a:xfrm>
+          <a:prstGeom prst="curvedConnector3">
+            <a:avLst>
+              <a:gd name="adj1" fmla="val 50000"/>
+            </a:avLst>
+          </a:prstGeom>
+          <a:ln w="19050"/>
+        </p:spPr>
+        <p:style>
+          <a:lnRef idx="1">
+            <a:schemeClr val="accent1"/>
+          </a:lnRef>
+          <a:fillRef idx="0">
+            <a:schemeClr val="accent1"/>
+          </a:fillRef>
+          <a:effectRef idx="0">
+            <a:schemeClr val="accent1"/>
+          </a:effectRef>
+          <a:fontRef idx="minor">
+            <a:schemeClr val="tx1"/>
+          </a:fontRef>
+        </p:style>
+      </p:cxnSp>
+      <p:sp>
+        <p:nvSpPr>
+          <p:cNvPr id="1715" name="Rounded Rectangle 1714">
+            <a:extLst>
+              <a:ext uri="{FF2B5EF4-FFF2-40B4-BE49-F238E27FC236}">
+                <a16:creationId xmlns:a16="http://schemas.microsoft.com/office/drawing/2014/main" id="{433117DC-8C8E-180C-FE2C-6E6FDF660E29}"/>
+              </a:ext>
+            </a:extLst>
+          </p:cNvPr>
+          <p:cNvSpPr/>
+          <p:nvPr/>
+        </p:nvSpPr>
+        <p:spPr>
+          <a:xfrm>
+            <a:off x="15548023" y="4611545"/>
+            <a:ext cx="1045567" cy="418274"/>
+          </a:xfrm>
+          <a:prstGeom prst="roundRect">
+            <a:avLst/>
+          </a:prstGeom>
+          <a:solidFill>
+            <a:schemeClr val="accent6">
+              <a:lumMod val="40000"/>
+              <a:lumOff val="60000"/>
+            </a:schemeClr>
+          </a:solidFill>
+          <a:ln w="38100">
+            <a:solidFill>
+              <a:schemeClr val="accent4"/>
+            </a:solidFill>
+          </a:ln>
+        </p:spPr>
+        <p:style>
+          <a:lnRef idx="2">
+            <a:schemeClr val="accent1">
+              <a:shade val="15000"/>
+            </a:schemeClr>
+          </a:lnRef>
+          <a:fillRef idx="1">
+            <a:schemeClr val="accent1"/>
+          </a:fillRef>
+          <a:effectRef idx="0">
+            <a:schemeClr val="accent1"/>
+          </a:effectRef>
+          <a:fontRef idx="minor">
+            <a:schemeClr val="lt1"/>
+          </a:fontRef>
+        </p:style>
+        <p:txBody>
+          <a:bodyPr rtlCol="0" anchor="ctr"/>
+          <a:lstStyle/>
+          <a:p>
+            <a:pPr algn="ctr"/>
+            <a:r>
+              <a:rPr lang="en-CH" sz="1100" dirty="0">
+                <a:solidFill>
+                  <a:schemeClr val="accent5">
+                    <a:lumMod val="50000"/>
+                  </a:schemeClr>
+                </a:solidFill>
+                <a:latin typeface="Baloo 2" panose="03080502040302020200" pitchFamily="66" charset="77"/>
+                <a:ea typeface="Palatino" pitchFamily="2" charset="77"/>
+                <a:cs typeface="Baloo 2" panose="03080502040302020200" pitchFamily="66" charset="77"/>
+              </a:rPr>
+              <a:t>PICK UP MECHANIC</a:t>
+            </a:r>
+          </a:p>
+        </p:txBody>
+      </p:sp>
+      <p:sp>
+        <p:nvSpPr>
+          <p:cNvPr id="1723" name="Rounded Rectangle 1722">
+            <a:extLst>
+              <a:ext uri="{FF2B5EF4-FFF2-40B4-BE49-F238E27FC236}">
+                <a16:creationId xmlns:a16="http://schemas.microsoft.com/office/drawing/2014/main" id="{2D84B7FC-8719-E0B8-673A-B0BC7C2E6159}"/>
+              </a:ext>
+            </a:extLst>
+          </p:cNvPr>
+          <p:cNvSpPr/>
+          <p:nvPr/>
+        </p:nvSpPr>
+        <p:spPr>
+          <a:xfrm>
+            <a:off x="27405546" y="2169412"/>
+            <a:ext cx="1045567" cy="418274"/>
+          </a:xfrm>
+          <a:prstGeom prst="roundRect">
+            <a:avLst/>
+          </a:prstGeom>
+          <a:solidFill>
+            <a:schemeClr val="accent6">
+              <a:lumMod val="40000"/>
+              <a:lumOff val="60000"/>
+            </a:schemeClr>
+          </a:solidFill>
+          <a:ln w="38100">
+            <a:solidFill>
+              <a:srgbClr val="00B050"/>
+            </a:solidFill>
+          </a:ln>
+        </p:spPr>
+        <p:style>
+          <a:lnRef idx="2">
+            <a:schemeClr val="accent1">
+              <a:shade val="15000"/>
+            </a:schemeClr>
+          </a:lnRef>
+          <a:fillRef idx="1">
+            <a:schemeClr val="accent1"/>
+          </a:fillRef>
+          <a:effectRef idx="0">
+            <a:schemeClr val="accent1"/>
+          </a:effectRef>
+          <a:fontRef idx="minor">
+            <a:schemeClr val="lt1"/>
+          </a:fontRef>
+        </p:style>
+        <p:txBody>
+          <a:bodyPr rtlCol="0" anchor="ctr"/>
+          <a:lstStyle/>
+          <a:p>
+            <a:pPr algn="ctr"/>
+            <a:r>
+              <a:rPr lang="en-CH" sz="1100" dirty="0">
+                <a:solidFill>
+                  <a:schemeClr val="accent5">
+                    <a:lumMod val="50000"/>
+                  </a:schemeClr>
+                </a:solidFill>
+                <a:latin typeface="Baloo 2" panose="03080502040302020200" pitchFamily="66" charset="77"/>
+                <a:ea typeface="Palatino" pitchFamily="2" charset="77"/>
+                <a:cs typeface="Baloo 2" panose="03080502040302020200" pitchFamily="66" charset="77"/>
+              </a:rPr>
+              <a:t>SHADER TRANSITION</a:t>
+            </a:r>
+          </a:p>
+        </p:txBody>
+      </p:sp>
+      <p:cxnSp>
+        <p:nvCxnSpPr>
+          <p:cNvPr id="1724" name="Curved Connector 1723">
+            <a:extLst>
+              <a:ext uri="{FF2B5EF4-FFF2-40B4-BE49-F238E27FC236}">
+                <a16:creationId xmlns:a16="http://schemas.microsoft.com/office/drawing/2014/main" id="{05AE5A18-7775-BF4F-9701-EF0795D71BAA}"/>
+              </a:ext>
+            </a:extLst>
+          </p:cNvPr>
+          <p:cNvCxnSpPr>
+            <a:cxnSpLocks/>
+            <a:stCxn id="982" idx="2"/>
+            <a:endCxn id="1723" idx="0"/>
+          </p:cNvCxnSpPr>
+          <p:nvPr/>
+        </p:nvCxnSpPr>
+        <p:spPr>
+          <a:xfrm rot="16200000" flipH="1">
+            <a:off x="27484021" y="1725103"/>
+            <a:ext cx="294416" cy="594202"/>
           </a:xfrm>
           <a:prstGeom prst="curvedConnector3">
             <a:avLst>
@@ -12997,7 +13221,7 @@
         <p:spPr>
           <a:xfrm>
             <a:off x="11277033" y="375176"/>
-            <a:ext cx="14141885" cy="369332"/>
+            <a:ext cx="15352473" cy="369332"/>
           </a:xfrm>
           <a:prstGeom prst="rect">
             <a:avLst/>
@@ -13012,7 +13236,7 @@
           <a:p>
             <a:r>
               <a:rPr lang="en-CH" dirty="0"/>
-              <a:t>THIS MODEL DOES NOT ACCOUNT FOR EVERY SINGLE NODE. IT IS MERELY MEANT TO REPRESENT THE ORGANISATIONAL LOGIC BEHIND THE PROJECT.</a:t>
+              <a:t>THIS MODEL DOES NOT ACCOUNT FOR EVERY SINGLE NODE OR FEATURE. IT IS MERELY MEANT TO REPRESENT THE ORGANISATIONAL LOGIC BEHIND THE PROJECT.</a:t>
             </a:r>
           </a:p>
         </p:txBody>

</xml_diff>

<commit_message>
Solved github authorization issues. Finalized GDD. Finalized main shaders. Proto level progress.
</commit_message>
<xml_diff>
--- a/Design Documents/Systems.pptx
+++ b/Design Documents/Systems.pptx
@@ -12813,6 +12813,51 @@
           </a:p>
         </p:txBody>
       </p:sp>
+      <p:sp>
+        <p:nvSpPr>
+          <p:cNvPr id="1764" name="TextBox 1763">
+            <a:extLst>
+              <a:ext uri="{FF2B5EF4-FFF2-40B4-BE49-F238E27FC236}">
+                <a16:creationId xmlns:a16="http://schemas.microsoft.com/office/drawing/2014/main" id="{9FFF29F7-2B2F-51F6-E7F2-5C894616F2D5}"/>
+              </a:ext>
+            </a:extLst>
+          </p:cNvPr>
+          <p:cNvSpPr txBox="1"/>
+          <p:nvPr/>
+        </p:nvSpPr>
+        <p:spPr>
+          <a:xfrm rot="1271390">
+            <a:off x="11003639" y="3338359"/>
+            <a:ext cx="15164921" cy="1569660"/>
+          </a:xfrm>
+          <a:prstGeom prst="rect">
+            <a:avLst/>
+          </a:prstGeom>
+          <a:solidFill>
+            <a:schemeClr val="accent4">
+              <a:alpha val="75000"/>
+            </a:schemeClr>
+          </a:solidFill>
+        </p:spPr>
+        <p:txBody>
+          <a:bodyPr wrap="none" rtlCol="0">
+            <a:spAutoFit/>
+          </a:bodyPr>
+          <a:lstStyle/>
+          <a:p>
+            <a:r>
+              <a:rPr lang="en-CH" sz="9600" b="1" dirty="0">
+                <a:solidFill>
+                  <a:srgbClr val="C00000">
+                    <a:alpha val="30827"/>
+                  </a:srgbClr>
+                </a:solidFill>
+              </a:rPr>
+              <a:t>OBSOLETE. SEE GDD INSTEAD</a:t>
+            </a:r>
+          </a:p>
+        </p:txBody>
+      </p:sp>
     </p:spTree>
     <p:extLst>
       <p:ext uri="{BB962C8B-B14F-4D97-AF65-F5344CB8AC3E}">

</xml_diff>